<commit_message>
Finishing touches Python trainees part 2
</commit_message>
<xml_diff>
--- a/python_trainees/2_production_code/python_traineeship_2.pptx
+++ b/python_trainees/2_production_code/python_traineeship_2.pptx
@@ -5046,7 +5046,7 @@
                 <a:latin typeface="Courier New" panose="02070309020205020404" pitchFamily="49" charset="0"/>
                 <a:cs typeface="Courier New" panose="02070309020205020404" pitchFamily="49" charset="0"/>
               </a:rPr>
-              <a:t>    """Load dataset A from file."""</a:t>
+              <a:t>    """Load dataset from file."""</a:t>
             </a:r>
           </a:p>
           <a:p>
@@ -7646,7 +7646,7 @@
             </a:pPr>
             <a:r>
               <a:rPr lang="nl-NL" sz="2000" dirty="0"/>
-              <a:t>Wat zijn geldige opties / waardes?</a:t>
+              <a:t>Wat zijn geldige opties of waardes?</a:t>
             </a:r>
           </a:p>
           <a:p>
@@ -7656,7 +7656,7 @@
             </a:pPr>
             <a:r>
               <a:rPr lang="nl-NL" sz="2000" dirty="0"/>
-              <a:t>Ongeldige / ontbrekende waardes?</a:t>
+              <a:t>Wat gebeurt er bij ongeldige of ontbrekende waardes?</a:t>
             </a:r>
           </a:p>
           <a:p>
@@ -8394,41 +8394,6 @@
               <a:rPr lang="nl-NL" sz="2000" noProof="0" dirty="0"/>
               <a:t>Documentatie</a:t>
             </a:r>
-          </a:p>
-          <a:p>
-            <a:pPr lvl="1">
-              <a:spcAft>
-                <a:spcPts val="600"/>
-              </a:spcAft>
-            </a:pPr>
-            <a:r>
-              <a:rPr lang="nl-NL" sz="1600" dirty="0"/>
-              <a:t>README</a:t>
-            </a:r>
-          </a:p>
-          <a:p>
-            <a:pPr lvl="1">
-              <a:spcAft>
-                <a:spcPts val="600"/>
-              </a:spcAft>
-            </a:pPr>
-            <a:r>
-              <a:rPr lang="nl-NL" sz="1600" noProof="0" dirty="0" err="1"/>
-              <a:t>Docstrings</a:t>
-            </a:r>
-            <a:endParaRPr lang="nl-NL" sz="1600" noProof="0" dirty="0"/>
-          </a:p>
-          <a:p>
-            <a:pPr lvl="1">
-              <a:spcAft>
-                <a:spcPts val="600"/>
-              </a:spcAft>
-            </a:pPr>
-            <a:r>
-              <a:rPr lang="nl-NL" sz="1600" dirty="0" err="1"/>
-              <a:t>Comments</a:t>
-            </a:r>
-            <a:endParaRPr lang="nl-NL" sz="1600" noProof="0" dirty="0"/>
           </a:p>
           <a:p>
             <a:pPr>
@@ -8577,7 +8542,7 @@
           <a:p>
             <a:r>
               <a:rPr lang="nl-NL" sz="3600" noProof="0" dirty="0"/>
-              <a:t>Oefeningen I</a:t>
+              <a:t>Oplossing I</a:t>
             </a:r>
           </a:p>
         </p:txBody>
@@ -8650,12 +8615,8 @@
               <a:buChar char="-"/>
             </a:pPr>
             <a:r>
-              <a:rPr lang="nl-NL" sz="2000" dirty="0" err="1"/>
-              <a:t>Settings</a:t>
-            </a:r>
-            <a:r>
               <a:rPr lang="nl-NL" sz="2000" dirty="0"/>
-              <a:t> tussen de code.</a:t>
+              <a:t>Instellingen tussen de code.</a:t>
             </a:r>
           </a:p>
           <a:p>
@@ -15292,7 +15253,7 @@
               <a:buNone/>
             </a:pPr>
             <a:r>
-              <a:rPr lang="en-US" sz="1400">
+              <a:rPr lang="en-US" sz="1400" dirty="0">
                 <a:latin typeface="Courier New" panose="02070309020205020404" pitchFamily="49" charset="0"/>
                 <a:cs typeface="Courier New" panose="02070309020205020404" pitchFamily="49" charset="0"/>
               </a:rPr>
@@ -15304,19 +15265,33 @@
               <a:buNone/>
             </a:pPr>
             <a:r>
-              <a:rPr lang="en-US" sz="1400">
-                <a:latin typeface="Courier New" panose="02070309020205020404" pitchFamily="49" charset="0"/>
-                <a:cs typeface="Courier New" panose="02070309020205020404" pitchFamily="49" charset="0"/>
-              </a:rPr>
-              <a:t>%(levelname)s	# Logging level.</a:t>
-            </a:r>
-          </a:p>
-          <a:p>
-            <a:pPr marL="0" indent="0">
-              <a:buNone/>
-            </a:pPr>
-            <a:r>
-              <a:rPr lang="en-US" sz="1400">
+              <a:rPr lang="en-US" sz="1400" dirty="0">
+                <a:latin typeface="Courier New" panose="02070309020205020404" pitchFamily="49" charset="0"/>
+                <a:cs typeface="Courier New" panose="02070309020205020404" pitchFamily="49" charset="0"/>
+              </a:rPr>
+              <a:t>%(</a:t>
+            </a:r>
+            <a:r>
+              <a:rPr lang="en-US" sz="1400" dirty="0" err="1">
+                <a:latin typeface="Courier New" panose="02070309020205020404" pitchFamily="49" charset="0"/>
+                <a:cs typeface="Courier New" panose="02070309020205020404" pitchFamily="49" charset="0"/>
+              </a:rPr>
+              <a:t>levelname</a:t>
+            </a:r>
+            <a:r>
+              <a:rPr lang="en-US" sz="1400" dirty="0">
+                <a:latin typeface="Courier New" panose="02070309020205020404" pitchFamily="49" charset="0"/>
+                <a:cs typeface="Courier New" panose="02070309020205020404" pitchFamily="49" charset="0"/>
+              </a:rPr>
+              <a:t>)s	# Logging level.</a:t>
+            </a:r>
+          </a:p>
+          <a:p>
+            <a:pPr marL="0" indent="0">
+              <a:buNone/>
+            </a:pPr>
+            <a:r>
+              <a:rPr lang="en-US" sz="1400" dirty="0">
                 <a:latin typeface="Courier New" panose="02070309020205020404" pitchFamily="49" charset="0"/>
                 <a:cs typeface="Courier New" panose="02070309020205020404" pitchFamily="49" charset="0"/>
               </a:rPr>
@@ -15328,54 +15303,96 @@
               <a:buNone/>
             </a:pPr>
             <a:r>
-              <a:rPr lang="en-US" sz="1400">
-                <a:latin typeface="Courier New" panose="02070309020205020404" pitchFamily="49" charset="0"/>
-                <a:cs typeface="Courier New" panose="02070309020205020404" pitchFamily="49" charset="0"/>
-              </a:rPr>
-              <a:t>%(asctime)s	# Time of the log message.</a:t>
-            </a:r>
-          </a:p>
-          <a:p>
-            <a:pPr marL="0" indent="0">
-              <a:buNone/>
-            </a:pPr>
-            <a:r>
-              <a:rPr lang="en-US" sz="1400">
-                <a:latin typeface="Courier New" panose="02070309020205020404" pitchFamily="49" charset="0"/>
-                <a:cs typeface="Courier New" panose="02070309020205020404" pitchFamily="49" charset="0"/>
-              </a:rPr>
-              <a:t>%(module)	# Module name.</a:t>
-            </a:r>
-          </a:p>
-          <a:p>
-            <a:pPr marL="0" indent="0">
-              <a:buNone/>
-            </a:pPr>
-            <a:r>
-              <a:rPr lang="en-US" sz="1400">
-                <a:latin typeface="Courier New" panose="02070309020205020404" pitchFamily="49" charset="0"/>
-                <a:cs typeface="Courier New" panose="02070309020205020404" pitchFamily="49" charset="0"/>
-              </a:rPr>
-              <a:t>%(funcname)	# Function name.</a:t>
-            </a:r>
-          </a:p>
-          <a:p>
-            <a:pPr marL="0" indent="0">
-              <a:buNone/>
-            </a:pPr>
-            <a:r>
-              <a:rPr lang="en-US" sz="1400">
-                <a:latin typeface="Courier New" panose="02070309020205020404" pitchFamily="49" charset="0"/>
-                <a:cs typeface="Courier New" panose="02070309020205020404" pitchFamily="49" charset="0"/>
-              </a:rPr>
-              <a:t>%(lineno)	# Line number.</a:t>
-            </a:r>
-          </a:p>
-          <a:p>
-            <a:pPr marL="0" indent="0">
-              <a:buNone/>
-            </a:pPr>
-            <a:endParaRPr lang="en-US" sz="1400">
+              <a:rPr lang="en-US" sz="1400" dirty="0">
+                <a:latin typeface="Courier New" panose="02070309020205020404" pitchFamily="49" charset="0"/>
+                <a:cs typeface="Courier New" panose="02070309020205020404" pitchFamily="49" charset="0"/>
+              </a:rPr>
+              <a:t>%(</a:t>
+            </a:r>
+            <a:r>
+              <a:rPr lang="en-US" sz="1400" dirty="0" err="1">
+                <a:latin typeface="Courier New" panose="02070309020205020404" pitchFamily="49" charset="0"/>
+                <a:cs typeface="Courier New" panose="02070309020205020404" pitchFamily="49" charset="0"/>
+              </a:rPr>
+              <a:t>asctime</a:t>
+            </a:r>
+            <a:r>
+              <a:rPr lang="en-US" sz="1400" dirty="0">
+                <a:latin typeface="Courier New" panose="02070309020205020404" pitchFamily="49" charset="0"/>
+                <a:cs typeface="Courier New" panose="02070309020205020404" pitchFamily="49" charset="0"/>
+              </a:rPr>
+              <a:t>)s	# Time of the log message.</a:t>
+            </a:r>
+          </a:p>
+          <a:p>
+            <a:pPr marL="0" indent="0">
+              <a:buNone/>
+            </a:pPr>
+            <a:r>
+              <a:rPr lang="en-US" sz="1400" dirty="0">
+                <a:latin typeface="Courier New" panose="02070309020205020404" pitchFamily="49" charset="0"/>
+                <a:cs typeface="Courier New" panose="02070309020205020404" pitchFamily="49" charset="0"/>
+              </a:rPr>
+              <a:t>%(module)s	# Module name.</a:t>
+            </a:r>
+          </a:p>
+          <a:p>
+            <a:pPr marL="0" indent="0">
+              <a:buNone/>
+            </a:pPr>
+            <a:r>
+              <a:rPr lang="en-US" sz="1400" dirty="0">
+                <a:latin typeface="Courier New" panose="02070309020205020404" pitchFamily="49" charset="0"/>
+                <a:cs typeface="Courier New" panose="02070309020205020404" pitchFamily="49" charset="0"/>
+              </a:rPr>
+              <a:t>%(</a:t>
+            </a:r>
+            <a:r>
+              <a:rPr lang="en-US" sz="1400" dirty="0" err="1">
+                <a:latin typeface="Courier New" panose="02070309020205020404" pitchFamily="49" charset="0"/>
+                <a:cs typeface="Courier New" panose="02070309020205020404" pitchFamily="49" charset="0"/>
+              </a:rPr>
+              <a:t>funcname</a:t>
+            </a:r>
+            <a:r>
+              <a:rPr lang="en-US" sz="1400" dirty="0">
+                <a:latin typeface="Courier New" panose="02070309020205020404" pitchFamily="49" charset="0"/>
+                <a:cs typeface="Courier New" panose="02070309020205020404" pitchFamily="49" charset="0"/>
+              </a:rPr>
+              <a:t>)s	# Function name.</a:t>
+            </a:r>
+          </a:p>
+          <a:p>
+            <a:pPr marL="0" indent="0">
+              <a:buNone/>
+            </a:pPr>
+            <a:r>
+              <a:rPr lang="en-US" sz="1400" dirty="0">
+                <a:latin typeface="Courier New" panose="02070309020205020404" pitchFamily="49" charset="0"/>
+                <a:cs typeface="Courier New" panose="02070309020205020404" pitchFamily="49" charset="0"/>
+              </a:rPr>
+              <a:t>%(</a:t>
+            </a:r>
+            <a:r>
+              <a:rPr lang="en-US" sz="1400" dirty="0" err="1">
+                <a:latin typeface="Courier New" panose="02070309020205020404" pitchFamily="49" charset="0"/>
+                <a:cs typeface="Courier New" panose="02070309020205020404" pitchFamily="49" charset="0"/>
+              </a:rPr>
+              <a:t>lineno</a:t>
+            </a:r>
+            <a:r>
+              <a:rPr lang="en-US" sz="1400" dirty="0">
+                <a:latin typeface="Courier New" panose="02070309020205020404" pitchFamily="49" charset="0"/>
+                <a:cs typeface="Courier New" panose="02070309020205020404" pitchFamily="49" charset="0"/>
+              </a:rPr>
+              <a:t>)d	# Line number.</a:t>
+            </a:r>
+          </a:p>
+          <a:p>
+            <a:pPr marL="0" indent="0">
+              <a:buNone/>
+            </a:pPr>
+            <a:endParaRPr lang="en-US" sz="1400" dirty="0">
               <a:latin typeface="Courier New" panose="02070309020205020404" pitchFamily="49" charset="0"/>
               <a:cs typeface="Courier New" panose="02070309020205020404" pitchFamily="49" charset="0"/>
             </a:endParaRPr>
@@ -15384,7 +15401,7 @@
             <a:pPr marL="0" indent="0">
               <a:buNone/>
             </a:pPr>
-            <a:endParaRPr lang="en-US" sz="1400">
+            <a:endParaRPr lang="en-US" sz="1400" dirty="0">
               <a:latin typeface="Courier New" panose="02070309020205020404" pitchFamily="49" charset="0"/>
               <a:cs typeface="Courier New" panose="02070309020205020404" pitchFamily="49" charset="0"/>
             </a:endParaRPr>
@@ -15394,7 +15411,7 @@
               <a:buNone/>
             </a:pPr>
             <a:r>
-              <a:rPr lang="en-US" sz="1400">
+              <a:rPr lang="en-US" sz="1400" dirty="0">
                 <a:latin typeface="Courier New" panose="02070309020205020404" pitchFamily="49" charset="0"/>
                 <a:cs typeface="Courier New" panose="02070309020205020404" pitchFamily="49" charset="0"/>
               </a:rPr>
@@ -15406,30 +15423,86 @@
               <a:buNone/>
             </a:pPr>
             <a:r>
-              <a:rPr lang="en-US" sz="1400">
-                <a:latin typeface="Courier New" panose="02070309020205020404" pitchFamily="49" charset="0"/>
-                <a:cs typeface="Courier New" panose="02070309020205020404" pitchFamily="49" charset="0"/>
-              </a:rPr>
-              <a:t>fmt = "%(asctime)s|%(levelname)s|%(message)s"</a:t>
-            </a:r>
-          </a:p>
-          <a:p>
-            <a:pPr marL="0" indent="0">
-              <a:buNone/>
-            </a:pPr>
-            <a:r>
-              <a:rPr lang="en-US" sz="1400">
-                <a:latin typeface="Courier New" panose="02070309020205020404" pitchFamily="49" charset="0"/>
-                <a:cs typeface="Courier New" panose="02070309020205020404" pitchFamily="49" charset="0"/>
-              </a:rPr>
-              <a:t>logging.basicConfig(format=fmt)</a:t>
-            </a:r>
-          </a:p>
-          <a:p>
-            <a:pPr marL="0" indent="0">
-              <a:buNone/>
-            </a:pPr>
-            <a:endParaRPr lang="en-US" sz="1400">
+              <a:rPr lang="en-US" sz="1400" dirty="0" err="1">
+                <a:latin typeface="Courier New" panose="02070309020205020404" pitchFamily="49" charset="0"/>
+                <a:cs typeface="Courier New" panose="02070309020205020404" pitchFamily="49" charset="0"/>
+              </a:rPr>
+              <a:t>fmt</a:t>
+            </a:r>
+            <a:r>
+              <a:rPr lang="en-US" sz="1400" dirty="0">
+                <a:latin typeface="Courier New" panose="02070309020205020404" pitchFamily="49" charset="0"/>
+                <a:cs typeface="Courier New" panose="02070309020205020404" pitchFamily="49" charset="0"/>
+              </a:rPr>
+              <a:t> = "%(</a:t>
+            </a:r>
+            <a:r>
+              <a:rPr lang="en-US" sz="1400" dirty="0" err="1">
+                <a:latin typeface="Courier New" panose="02070309020205020404" pitchFamily="49" charset="0"/>
+                <a:cs typeface="Courier New" panose="02070309020205020404" pitchFamily="49" charset="0"/>
+              </a:rPr>
+              <a:t>asctime</a:t>
+            </a:r>
+            <a:r>
+              <a:rPr lang="en-US" sz="1400" dirty="0">
+                <a:latin typeface="Courier New" panose="02070309020205020404" pitchFamily="49" charset="0"/>
+                <a:cs typeface="Courier New" panose="02070309020205020404" pitchFamily="49" charset="0"/>
+              </a:rPr>
+              <a:t>)s|%(</a:t>
+            </a:r>
+            <a:r>
+              <a:rPr lang="en-US" sz="1400" dirty="0" err="1">
+                <a:latin typeface="Courier New" panose="02070309020205020404" pitchFamily="49" charset="0"/>
+                <a:cs typeface="Courier New" panose="02070309020205020404" pitchFamily="49" charset="0"/>
+              </a:rPr>
+              <a:t>levelname</a:t>
+            </a:r>
+            <a:r>
+              <a:rPr lang="en-US" sz="1400" dirty="0">
+                <a:latin typeface="Courier New" panose="02070309020205020404" pitchFamily="49" charset="0"/>
+                <a:cs typeface="Courier New" panose="02070309020205020404" pitchFamily="49" charset="0"/>
+              </a:rPr>
+              <a:t>)s|%(message)s"</a:t>
+            </a:r>
+          </a:p>
+          <a:p>
+            <a:pPr marL="0" indent="0">
+              <a:buNone/>
+            </a:pPr>
+            <a:r>
+              <a:rPr lang="en-US" sz="1400" dirty="0" err="1">
+                <a:latin typeface="Courier New" panose="02070309020205020404" pitchFamily="49" charset="0"/>
+                <a:cs typeface="Courier New" panose="02070309020205020404" pitchFamily="49" charset="0"/>
+              </a:rPr>
+              <a:t>logging.basicConfig</a:t>
+            </a:r>
+            <a:r>
+              <a:rPr lang="en-US" sz="1400" dirty="0">
+                <a:latin typeface="Courier New" panose="02070309020205020404" pitchFamily="49" charset="0"/>
+                <a:cs typeface="Courier New" panose="02070309020205020404" pitchFamily="49" charset="0"/>
+              </a:rPr>
+              <a:t>(format=</a:t>
+            </a:r>
+            <a:r>
+              <a:rPr lang="en-US" sz="1400" dirty="0" err="1">
+                <a:latin typeface="Courier New" panose="02070309020205020404" pitchFamily="49" charset="0"/>
+                <a:cs typeface="Courier New" panose="02070309020205020404" pitchFamily="49" charset="0"/>
+              </a:rPr>
+              <a:t>fmt</a:t>
+            </a:r>
+            <a:r>
+              <a:rPr lang="en-US" sz="1400" dirty="0">
+                <a:latin typeface="Courier New" panose="02070309020205020404" pitchFamily="49" charset="0"/>
+                <a:cs typeface="Courier New" panose="02070309020205020404" pitchFamily="49" charset="0"/>
+              </a:rPr>
+              <a:t>)</a:t>
+            </a:r>
+          </a:p>
+          <a:p>
+            <a:pPr marL="0" indent="0">
+              <a:buNone/>
+            </a:pPr>
+            <a:endParaRPr lang="en-US" sz="1400" dirty="0">
               <a:latin typeface="Courier New" panose="02070309020205020404" pitchFamily="49" charset="0"/>
               <a:cs typeface="Courier New" panose="02070309020205020404" pitchFamily="49" charset="0"/>
             </a:endParaRPr>
@@ -15438,7 +15511,7 @@
             <a:pPr marL="0" indent="0">
               <a:buNone/>
             </a:pPr>
-            <a:endParaRPr lang="en-US" sz="1400">
+            <a:endParaRPr lang="en-US" sz="1400" dirty="0">
               <a:latin typeface="Courier New" panose="02070309020205020404" pitchFamily="49" charset="0"/>
               <a:cs typeface="Courier New" panose="02070309020205020404" pitchFamily="49" charset="0"/>
             </a:endParaRPr>
@@ -15497,7 +15570,7 @@
           <a:lstStyle/>
           <a:p>
             <a:r>
-              <a:rPr lang="nl-NL"/>
+              <a:rPr lang="nl-NL" dirty="0"/>
               <a:t>Goede principes</a:t>
             </a:r>
           </a:p>
@@ -15750,7 +15823,15 @@
             <a:pPr lvl="1"/>
             <a:r>
               <a:rPr lang="nl-NL" sz="2000" noProof="0" dirty="0"/>
-              <a:t>Toon tenminste: tijdstip, level, naam logger en bericht.</a:t>
+              <a:t>Log tenminste: tijdstip</a:t>
+            </a:r>
+            <a:r>
+              <a:rPr lang="nl-NL" sz="2000" noProof="0"/>
+              <a:t>, niveau, </a:t>
+            </a:r>
+            <a:r>
+              <a:rPr lang="nl-NL" sz="2000" noProof="0" dirty="0"/>
+              <a:t>naam logger en bericht.</a:t>
             </a:r>
           </a:p>
         </p:txBody>
@@ -21247,7 +21328,7 @@
             </a:pPr>
             <a:r>
               <a:rPr lang="nl-NL" sz="2000" dirty="0"/>
-              <a:t>Ontwerp principes helpen om betere code te schrijven.</a:t>
+              <a:t>Ontwerp principes helpen betere code te schrijven.</a:t>
             </a:r>
           </a:p>
           <a:p>
@@ -21262,7 +21343,7 @@
             </a:pPr>
             <a:r>
               <a:rPr lang="nl-NL" sz="2000" dirty="0"/>
-              <a:t>Goede code is…</a:t>
+              <a:t>Goede code is:</a:t>
             </a:r>
           </a:p>
           <a:p>
@@ -21272,7 +21353,17 @@
             </a:pPr>
             <a:r>
               <a:rPr lang="nl-NL" sz="2000" dirty="0"/>
-              <a:t>Leesbaar en gestructureerd.</a:t>
+              <a:t>Leesbaar.</a:t>
+            </a:r>
+          </a:p>
+          <a:p>
+            <a:pPr>
+              <a:buFontTx/>
+              <a:buChar char="-"/>
+            </a:pPr>
+            <a:r>
+              <a:rPr lang="nl-NL" sz="2000" dirty="0"/>
+              <a:t>Overzichtelijk gestructureerd.</a:t>
             </a:r>
           </a:p>
           <a:p>
@@ -28679,7 +28770,15 @@
           <a:p>
             <a:r>
               <a:rPr lang="nl-NL" sz="3600" noProof="0" dirty="0"/>
-              <a:t>Instellen in VS Code</a:t>
+              <a:t>Leesbaar: </a:t>
+            </a:r>
+            <a:r>
+              <a:rPr lang="nl-NL" sz="3600" noProof="0" dirty="0" err="1"/>
+              <a:t>Settings</a:t>
+            </a:r>
+            <a:r>
+              <a:rPr lang="nl-NL" sz="3600" noProof="0" dirty="0"/>
+              <a:t> in VS Code</a:t>
             </a:r>
           </a:p>
         </p:txBody>
@@ -28739,7 +28838,7 @@
               <a:rPr lang="nl-NL" sz="2000" dirty="0">
                 <a:cs typeface="Courier New" panose="02070309020205020404" pitchFamily="49" charset="0"/>
               </a:rPr>
-              <a:t>    =&gt;    "Python &gt; </a:t>
+              <a:t>                      &gt;    "Python &gt; </a:t>
             </a:r>
             <a:r>
               <a:rPr lang="nl-NL" sz="2000" dirty="0" err="1">
@@ -28751,7 +28850,7 @@
               <a:rPr lang="nl-NL" sz="2000" dirty="0">
                 <a:cs typeface="Courier New" panose="02070309020205020404" pitchFamily="49" charset="0"/>
               </a:rPr>
-              <a:t>"    =&gt;    Python: </a:t>
+              <a:t>"    &gt;      Python: </a:t>
             </a:r>
             <a:r>
               <a:rPr lang="nl-NL" sz="2000" dirty="0" err="1">
@@ -28774,7 +28873,7 @@
               <a:rPr lang="nl-NL" sz="2000" dirty="0">
                 <a:cs typeface="Courier New" panose="02070309020205020404" pitchFamily="49" charset="0"/>
               </a:rPr>
-              <a:t>Command Palette    =&gt;    Format Document (SHIFT + ALT + F)</a:t>
+              <a:t>Command Palette    &gt;    Format Document            /       SHIFT + ALT + F</a:t>
             </a:r>
           </a:p>
           <a:p>
@@ -28824,7 +28923,7 @@
               <a:rPr lang="nl-NL" sz="2000" dirty="0">
                 <a:cs typeface="Courier New" panose="02070309020205020404" pitchFamily="49" charset="0"/>
               </a:rPr>
-              <a:t>    =&gt;    "Python &gt; </a:t>
+              <a:t>                      &gt;    "Python &gt; </a:t>
             </a:r>
             <a:r>
               <a:rPr lang="nl-NL" sz="2000" dirty="0" err="1">
@@ -28836,7 +28935,7 @@
               <a:rPr lang="nl-NL" sz="2000" dirty="0">
                 <a:cs typeface="Courier New" panose="02070309020205020404" pitchFamily="49" charset="0"/>
               </a:rPr>
-              <a:t>"    =&gt;    Python &gt; </a:t>
+              <a:t>"             &gt;    Python &gt; </a:t>
             </a:r>
             <a:r>
               <a:rPr lang="nl-NL" sz="2000" dirty="0" err="1">
@@ -28880,7 +28979,7 @@
               <a:rPr lang="nl-NL" sz="2000" dirty="0">
                 <a:cs typeface="Courier New" panose="02070309020205020404" pitchFamily="49" charset="0"/>
               </a:rPr>
-              <a:t>                                                                =&gt;    Python &gt; </a:t>
+              <a:t>                                                                                        &gt;    Python &gt; </a:t>
             </a:r>
             <a:r>
               <a:rPr lang="nl-NL" sz="2000" dirty="0" err="1">
@@ -28903,7 +29002,7 @@
               <a:rPr lang="nl-NL" sz="2000" dirty="0">
                 <a:cs typeface="Courier New" panose="02070309020205020404" pitchFamily="49" charset="0"/>
               </a:rPr>
-              <a:t>Command Palette =&gt; "lint" &gt; Python: Run </a:t>
+              <a:t>Command Palette    &gt;    "lint"                                    &gt;    Python: Run </a:t>
             </a:r>
             <a:r>
               <a:rPr lang="nl-NL" sz="2000" dirty="0" err="1">

</xml_diff>

<commit_message>
Finalize part 2 and 3 of Python for trainees
</commit_message>
<xml_diff>
--- a/python_trainees/2_production_code/python_traineeship_2.pptx
+++ b/python_trainees/2_production_code/python_traineeship_2.pptx
@@ -268,7 +268,7 @@
           <a:p>
             <a:fld id="{7D183437-14DE-4969-B062-63D9C4A2E219}" type="datetimeFigureOut">
               <a:rPr lang="nl-NL" smtClean="0"/>
-              <a:t>26-9-2023</a:t>
+              <a:t>2-10-2023</a:t>
             </a:fld>
             <a:endParaRPr lang="nl-NL"/>
           </a:p>
@@ -1165,7 +1165,7 @@
           <a:p>
             <a:fld id="{0EBB069A-003F-4FC0-8534-236B0C5C7B5F}" type="datetimeFigureOut">
               <a:rPr lang="en-NL" smtClean="0"/>
-              <a:t>26/09/2023</a:t>
+              <a:t>02/10/2023</a:t>
             </a:fld>
             <a:endParaRPr lang="en-NL"/>
           </a:p>
@@ -1365,7 +1365,7 @@
           <a:p>
             <a:fld id="{0EBB069A-003F-4FC0-8534-236B0C5C7B5F}" type="datetimeFigureOut">
               <a:rPr lang="en-NL" smtClean="0"/>
-              <a:t>26/09/2023</a:t>
+              <a:t>02/10/2023</a:t>
             </a:fld>
             <a:endParaRPr lang="en-NL"/>
           </a:p>
@@ -1575,7 +1575,7 @@
           <a:p>
             <a:fld id="{0EBB069A-003F-4FC0-8534-236B0C5C7B5F}" type="datetimeFigureOut">
               <a:rPr lang="en-NL" smtClean="0"/>
-              <a:t>26/09/2023</a:t>
+              <a:t>02/10/2023</a:t>
             </a:fld>
             <a:endParaRPr lang="en-NL"/>
           </a:p>
@@ -1775,7 +1775,7 @@
           <a:p>
             <a:fld id="{0EBB069A-003F-4FC0-8534-236B0C5C7B5F}" type="datetimeFigureOut">
               <a:rPr lang="en-NL" smtClean="0"/>
-              <a:t>26/09/2023</a:t>
+              <a:t>02/10/2023</a:t>
             </a:fld>
             <a:endParaRPr lang="en-NL"/>
           </a:p>
@@ -2051,7 +2051,7 @@
           <a:p>
             <a:fld id="{0EBB069A-003F-4FC0-8534-236B0C5C7B5F}" type="datetimeFigureOut">
               <a:rPr lang="en-NL" smtClean="0"/>
-              <a:t>26/09/2023</a:t>
+              <a:t>02/10/2023</a:t>
             </a:fld>
             <a:endParaRPr lang="en-NL"/>
           </a:p>
@@ -2319,7 +2319,7 @@
           <a:p>
             <a:fld id="{0EBB069A-003F-4FC0-8534-236B0C5C7B5F}" type="datetimeFigureOut">
               <a:rPr lang="en-NL" smtClean="0"/>
-              <a:t>26/09/2023</a:t>
+              <a:t>02/10/2023</a:t>
             </a:fld>
             <a:endParaRPr lang="en-NL"/>
           </a:p>
@@ -2734,7 +2734,7 @@
           <a:p>
             <a:fld id="{0EBB069A-003F-4FC0-8534-236B0C5C7B5F}" type="datetimeFigureOut">
               <a:rPr lang="en-NL" smtClean="0"/>
-              <a:t>26/09/2023</a:t>
+              <a:t>02/10/2023</a:t>
             </a:fld>
             <a:endParaRPr lang="en-NL"/>
           </a:p>
@@ -2876,7 +2876,7 @@
           <a:p>
             <a:fld id="{0EBB069A-003F-4FC0-8534-236B0C5C7B5F}" type="datetimeFigureOut">
               <a:rPr lang="en-NL" smtClean="0"/>
-              <a:t>26/09/2023</a:t>
+              <a:t>02/10/2023</a:t>
             </a:fld>
             <a:endParaRPr lang="en-NL"/>
           </a:p>
@@ -2989,7 +2989,7 @@
           <a:p>
             <a:fld id="{0EBB069A-003F-4FC0-8534-236B0C5C7B5F}" type="datetimeFigureOut">
               <a:rPr lang="en-NL" smtClean="0"/>
-              <a:t>26/09/2023</a:t>
+              <a:t>02/10/2023</a:t>
             </a:fld>
             <a:endParaRPr lang="en-NL"/>
           </a:p>
@@ -3302,7 +3302,7 @@
           <a:p>
             <a:fld id="{0EBB069A-003F-4FC0-8534-236B0C5C7B5F}" type="datetimeFigureOut">
               <a:rPr lang="en-NL" smtClean="0"/>
-              <a:t>26/09/2023</a:t>
+              <a:t>02/10/2023</a:t>
             </a:fld>
             <a:endParaRPr lang="en-NL"/>
           </a:p>
@@ -3591,7 +3591,7 @@
           <a:p>
             <a:fld id="{0EBB069A-003F-4FC0-8534-236B0C5C7B5F}" type="datetimeFigureOut">
               <a:rPr lang="en-NL" smtClean="0"/>
-              <a:t>26/09/2023</a:t>
+              <a:t>02/10/2023</a:t>
             </a:fld>
             <a:endParaRPr lang="en-NL"/>
           </a:p>
@@ -3834,7 +3834,7 @@
           <a:p>
             <a:fld id="{0EBB069A-003F-4FC0-8534-236B0C5C7B5F}" type="datetimeFigureOut">
               <a:rPr lang="en-NL" smtClean="0"/>
-              <a:t>26/09/2023</a:t>
+              <a:t>02/10/2023</a:t>
             </a:fld>
             <a:endParaRPr lang="en-NL"/>
           </a:p>
@@ -5110,6 +5110,13 @@
                 <a:cs typeface="Courier New" panose="02070309020205020404" pitchFamily="49" charset="0"/>
               </a:rPr>
               <a:t>azure_database</a:t>
+            </a:r>
+            <a:r>
+              <a:rPr lang="nl-NL" sz="2000">
+                <a:latin typeface="Courier New" panose="02070309020205020404" pitchFamily="49" charset="0"/>
+                <a:cs typeface="Courier New" panose="02070309020205020404" pitchFamily="49" charset="0"/>
+              </a:rPr>
+              <a:t>/</a:t>
             </a:r>
             <a:endParaRPr lang="nl-NL" sz="2000" dirty="0">
               <a:latin typeface="Courier New" panose="02070309020205020404" pitchFamily="49" charset="0"/>

</xml_diff>